<commit_message>
Reworked physical constants calculations (pulse based distance) Updated documentation Reworked example sketches
</commit_message>
<xml_diff>
--- a/media/photo/SmartCar.pptx
+++ b/media/photo/SmartCar.pptx
@@ -5,7 +5,8 @@
     <p:sldMasterId id="2147483648" r:id="rId1"/>
   </p:sldMasterIdLst>
   <p:sldIdLst>
-    <p:sldId id="256" r:id="rId2"/>
+    <p:sldId id="257" r:id="rId2"/>
+    <p:sldId id="256" r:id="rId3"/>
   </p:sldIdLst>
   <p:sldSz cx="12192000" cy="6858000"/>
   <p:notesSz cx="6858000" cy="9144000"/>
@@ -261,7 +262,7 @@
           <a:p>
             <a:fld id="{04247DC2-A07E-4E7E-B14F-806BFE439A33}" type="datetimeFigureOut">
               <a:rPr lang="en-AU" smtClean="0"/>
-              <a:t>26/01/2021</a:t>
+              <a:t>8/03/2021</a:t>
             </a:fld>
             <a:endParaRPr lang="en-AU"/>
           </a:p>
@@ -461,7 +462,7 @@
           <a:p>
             <a:fld id="{04247DC2-A07E-4E7E-B14F-806BFE439A33}" type="datetimeFigureOut">
               <a:rPr lang="en-AU" smtClean="0"/>
-              <a:t>26/01/2021</a:t>
+              <a:t>8/03/2021</a:t>
             </a:fld>
             <a:endParaRPr lang="en-AU"/>
           </a:p>
@@ -671,7 +672,7 @@
           <a:p>
             <a:fld id="{04247DC2-A07E-4E7E-B14F-806BFE439A33}" type="datetimeFigureOut">
               <a:rPr lang="en-AU" smtClean="0"/>
-              <a:t>26/01/2021</a:t>
+              <a:t>8/03/2021</a:t>
             </a:fld>
             <a:endParaRPr lang="en-AU"/>
           </a:p>
@@ -871,7 +872,7 @@
           <a:p>
             <a:fld id="{04247DC2-A07E-4E7E-B14F-806BFE439A33}" type="datetimeFigureOut">
               <a:rPr lang="en-AU" smtClean="0"/>
-              <a:t>26/01/2021</a:t>
+              <a:t>8/03/2021</a:t>
             </a:fld>
             <a:endParaRPr lang="en-AU"/>
           </a:p>
@@ -1147,7 +1148,7 @@
           <a:p>
             <a:fld id="{04247DC2-A07E-4E7E-B14F-806BFE439A33}" type="datetimeFigureOut">
               <a:rPr lang="en-AU" smtClean="0"/>
-              <a:t>26/01/2021</a:t>
+              <a:t>8/03/2021</a:t>
             </a:fld>
             <a:endParaRPr lang="en-AU"/>
           </a:p>
@@ -1415,7 +1416,7 @@
           <a:p>
             <a:fld id="{04247DC2-A07E-4E7E-B14F-806BFE439A33}" type="datetimeFigureOut">
               <a:rPr lang="en-AU" smtClean="0"/>
-              <a:t>26/01/2021</a:t>
+              <a:t>8/03/2021</a:t>
             </a:fld>
             <a:endParaRPr lang="en-AU"/>
           </a:p>
@@ -1830,7 +1831,7 @@
           <a:p>
             <a:fld id="{04247DC2-A07E-4E7E-B14F-806BFE439A33}" type="datetimeFigureOut">
               <a:rPr lang="en-AU" smtClean="0"/>
-              <a:t>26/01/2021</a:t>
+              <a:t>8/03/2021</a:t>
             </a:fld>
             <a:endParaRPr lang="en-AU"/>
           </a:p>
@@ -1972,7 +1973,7 @@
           <a:p>
             <a:fld id="{04247DC2-A07E-4E7E-B14F-806BFE439A33}" type="datetimeFigureOut">
               <a:rPr lang="en-AU" smtClean="0"/>
-              <a:t>26/01/2021</a:t>
+              <a:t>8/03/2021</a:t>
             </a:fld>
             <a:endParaRPr lang="en-AU"/>
           </a:p>
@@ -2085,7 +2086,7 @@
           <a:p>
             <a:fld id="{04247DC2-A07E-4E7E-B14F-806BFE439A33}" type="datetimeFigureOut">
               <a:rPr lang="en-AU" smtClean="0"/>
-              <a:t>26/01/2021</a:t>
+              <a:t>8/03/2021</a:t>
             </a:fld>
             <a:endParaRPr lang="en-AU"/>
           </a:p>
@@ -2398,7 +2399,7 @@
           <a:p>
             <a:fld id="{04247DC2-A07E-4E7E-B14F-806BFE439A33}" type="datetimeFigureOut">
               <a:rPr lang="en-AU" smtClean="0"/>
-              <a:t>26/01/2021</a:t>
+              <a:t>8/03/2021</a:t>
             </a:fld>
             <a:endParaRPr lang="en-AU"/>
           </a:p>
@@ -2687,7 +2688,7 @@
           <a:p>
             <a:fld id="{04247DC2-A07E-4E7E-B14F-806BFE439A33}" type="datetimeFigureOut">
               <a:rPr lang="en-AU" smtClean="0"/>
-              <a:t>26/01/2021</a:t>
+              <a:t>8/03/2021</a:t>
             </a:fld>
             <a:endParaRPr lang="en-AU"/>
           </a:p>
@@ -2930,7 +2931,7 @@
           <a:p>
             <a:fld id="{04247DC2-A07E-4E7E-B14F-806BFE439A33}" type="datetimeFigureOut">
               <a:rPr lang="en-AU" smtClean="0"/>
-              <a:t>26/01/2021</a:t>
+              <a:t>8/03/2021</a:t>
             </a:fld>
             <a:endParaRPr lang="en-AU"/>
           </a:p>
@@ -3331,6 +3332,1251 @@
 </file>
 
 <file path=ppt/slides/slide1.xml><?xml version="1.0" encoding="utf-8"?>
+<p:sld xmlns:a="http://schemas.openxmlformats.org/drawingml/2006/main" xmlns:r="http://schemas.openxmlformats.org/officeDocument/2006/relationships" xmlns:p="http://schemas.openxmlformats.org/presentationml/2006/main">
+  <p:cSld>
+    <p:spTree>
+      <p:nvGrpSpPr>
+        <p:cNvPr id="1" name=""/>
+        <p:cNvGrpSpPr/>
+        <p:nvPr/>
+      </p:nvGrpSpPr>
+      <p:grpSpPr>
+        <a:xfrm>
+          <a:off x="0" y="0"/>
+          <a:ext cx="0" cy="0"/>
+          <a:chOff x="0" y="0"/>
+          <a:chExt cx="0" cy="0"/>
+        </a:xfrm>
+      </p:grpSpPr>
+      <p:sp>
+        <p:nvSpPr>
+          <p:cNvPr id="4" name="Rectangle 3">
+            <a:extLst>
+              <a:ext uri="{FF2B5EF4-FFF2-40B4-BE49-F238E27FC236}">
+                <a16:creationId xmlns:a16="http://schemas.microsoft.com/office/drawing/2014/main" id="{42A219AA-5258-4CDE-BF37-1E672A8827DE}"/>
+              </a:ext>
+            </a:extLst>
+          </p:cNvPr>
+          <p:cNvSpPr/>
+          <p:nvPr/>
+        </p:nvSpPr>
+        <p:spPr>
+          <a:xfrm>
+            <a:off x="1438415" y="1627550"/>
+            <a:ext cx="1312606" cy="693174"/>
+          </a:xfrm>
+          <a:prstGeom prst="rect">
+            <a:avLst/>
+          </a:prstGeom>
+          <a:ln>
+            <a:noFill/>
+          </a:ln>
+        </p:spPr>
+        <p:style>
+          <a:lnRef idx="2">
+            <a:schemeClr val="accent1">
+              <a:shade val="50000"/>
+            </a:schemeClr>
+          </a:lnRef>
+          <a:fillRef idx="1">
+            <a:schemeClr val="accent1"/>
+          </a:fillRef>
+          <a:effectRef idx="0">
+            <a:schemeClr val="accent1"/>
+          </a:effectRef>
+          <a:fontRef idx="minor">
+            <a:schemeClr val="lt1"/>
+          </a:fontRef>
+        </p:style>
+        <p:txBody>
+          <a:bodyPr rtlCol="0" anchor="ctr"/>
+          <a:lstStyle/>
+          <a:p>
+            <a:pPr algn="ctr"/>
+            <a:r>
+              <a:rPr lang="en-AU" sz="1400" dirty="0"/>
+              <a:t>Behaviour Control</a:t>
+            </a:r>
+          </a:p>
+        </p:txBody>
+      </p:sp>
+      <p:sp>
+        <p:nvSpPr>
+          <p:cNvPr id="5" name="Rectangle 4">
+            <a:extLst>
+              <a:ext uri="{FF2B5EF4-FFF2-40B4-BE49-F238E27FC236}">
+                <a16:creationId xmlns:a16="http://schemas.microsoft.com/office/drawing/2014/main" id="{504567E0-D094-412C-AD62-E80411416B00}"/>
+              </a:ext>
+            </a:extLst>
+          </p:cNvPr>
+          <p:cNvSpPr/>
+          <p:nvPr/>
+        </p:nvSpPr>
+        <p:spPr>
+          <a:xfrm>
+            <a:off x="3089524" y="1631284"/>
+            <a:ext cx="1312606" cy="693174"/>
+          </a:xfrm>
+          <a:prstGeom prst="rect">
+            <a:avLst/>
+          </a:prstGeom>
+          <a:ln>
+            <a:noFill/>
+          </a:ln>
+        </p:spPr>
+        <p:style>
+          <a:lnRef idx="2">
+            <a:schemeClr val="accent1">
+              <a:shade val="50000"/>
+            </a:schemeClr>
+          </a:lnRef>
+          <a:fillRef idx="1">
+            <a:schemeClr val="accent1"/>
+          </a:fillRef>
+          <a:effectRef idx="0">
+            <a:schemeClr val="accent1"/>
+          </a:effectRef>
+          <a:fontRef idx="minor">
+            <a:schemeClr val="lt1"/>
+          </a:fontRef>
+        </p:style>
+        <p:txBody>
+          <a:bodyPr rtlCol="0" anchor="ctr"/>
+          <a:lstStyle/>
+          <a:p>
+            <a:pPr algn="ctr"/>
+            <a:r>
+              <a:rPr lang="en-AU" sz="1400" dirty="0"/>
+              <a:t>Motion Control</a:t>
+            </a:r>
+          </a:p>
+        </p:txBody>
+      </p:sp>
+      <p:sp>
+        <p:nvSpPr>
+          <p:cNvPr id="7" name="Rectangle 6">
+            <a:extLst>
+              <a:ext uri="{FF2B5EF4-FFF2-40B4-BE49-F238E27FC236}">
+                <a16:creationId xmlns:a16="http://schemas.microsoft.com/office/drawing/2014/main" id="{62ADBA2A-68DA-484B-B1E5-9A380328C25F}"/>
+              </a:ext>
+            </a:extLst>
+          </p:cNvPr>
+          <p:cNvSpPr/>
+          <p:nvPr/>
+        </p:nvSpPr>
+        <p:spPr>
+          <a:xfrm>
+            <a:off x="4815939" y="1380928"/>
+            <a:ext cx="1312606" cy="540000"/>
+          </a:xfrm>
+          <a:prstGeom prst="rect">
+            <a:avLst/>
+          </a:prstGeom>
+          <a:ln>
+            <a:noFill/>
+          </a:ln>
+        </p:spPr>
+        <p:style>
+          <a:lnRef idx="2">
+            <a:schemeClr val="accent2">
+              <a:shade val="50000"/>
+            </a:schemeClr>
+          </a:lnRef>
+          <a:fillRef idx="1">
+            <a:schemeClr val="accent2"/>
+          </a:fillRef>
+          <a:effectRef idx="0">
+            <a:schemeClr val="accent2"/>
+          </a:effectRef>
+          <a:fontRef idx="minor">
+            <a:schemeClr val="lt1"/>
+          </a:fontRef>
+        </p:style>
+        <p:txBody>
+          <a:bodyPr rtlCol="0" anchor="ctr"/>
+          <a:lstStyle/>
+          <a:p>
+            <a:pPr algn="ctr"/>
+            <a:r>
+              <a:rPr lang="en-AU" sz="1400" dirty="0">
+                <a:solidFill>
+                  <a:schemeClr val="tx1"/>
+                </a:solidFill>
+              </a:rPr>
+              <a:t>Motor #1 Controller</a:t>
+            </a:r>
+          </a:p>
+        </p:txBody>
+      </p:sp>
+      <p:sp>
+        <p:nvSpPr>
+          <p:cNvPr id="8" name="Rectangle 7">
+            <a:extLst>
+              <a:ext uri="{FF2B5EF4-FFF2-40B4-BE49-F238E27FC236}">
+                <a16:creationId xmlns:a16="http://schemas.microsoft.com/office/drawing/2014/main" id="{E9E840DE-CA75-4617-8A7A-06F21042ED1E}"/>
+              </a:ext>
+            </a:extLst>
+          </p:cNvPr>
+          <p:cNvSpPr/>
+          <p:nvPr/>
+        </p:nvSpPr>
+        <p:spPr>
+          <a:xfrm>
+            <a:off x="4815939" y="2064866"/>
+            <a:ext cx="1312606" cy="540000"/>
+          </a:xfrm>
+          <a:prstGeom prst="rect">
+            <a:avLst/>
+          </a:prstGeom>
+          <a:ln>
+            <a:noFill/>
+          </a:ln>
+        </p:spPr>
+        <p:style>
+          <a:lnRef idx="2">
+            <a:schemeClr val="accent2">
+              <a:shade val="50000"/>
+            </a:schemeClr>
+          </a:lnRef>
+          <a:fillRef idx="1">
+            <a:schemeClr val="accent2"/>
+          </a:fillRef>
+          <a:effectRef idx="0">
+            <a:schemeClr val="accent2"/>
+          </a:effectRef>
+          <a:fontRef idx="minor">
+            <a:schemeClr val="lt1"/>
+          </a:fontRef>
+        </p:style>
+        <p:txBody>
+          <a:bodyPr rtlCol="0" anchor="ctr"/>
+          <a:lstStyle/>
+          <a:p>
+            <a:pPr algn="ctr"/>
+            <a:r>
+              <a:rPr lang="en-AU" sz="1400" dirty="0">
+                <a:solidFill>
+                  <a:schemeClr val="tx1"/>
+                </a:solidFill>
+              </a:rPr>
+              <a:t>Motor #2 Controller</a:t>
+            </a:r>
+          </a:p>
+        </p:txBody>
+      </p:sp>
+      <p:sp>
+        <p:nvSpPr>
+          <p:cNvPr id="9" name="Rectangle 8">
+            <a:extLst>
+              <a:ext uri="{FF2B5EF4-FFF2-40B4-BE49-F238E27FC236}">
+                <a16:creationId xmlns:a16="http://schemas.microsoft.com/office/drawing/2014/main" id="{D39AEA59-E3F2-413C-BFE6-056F2215BCAC}"/>
+              </a:ext>
+            </a:extLst>
+          </p:cNvPr>
+          <p:cNvSpPr/>
+          <p:nvPr/>
+        </p:nvSpPr>
+        <p:spPr>
+          <a:xfrm>
+            <a:off x="4815939" y="2701493"/>
+            <a:ext cx="1312606" cy="540000"/>
+          </a:xfrm>
+          <a:prstGeom prst="rect">
+            <a:avLst/>
+          </a:prstGeom>
+          <a:solidFill>
+            <a:schemeClr val="accent6"/>
+          </a:solidFill>
+          <a:ln>
+            <a:noFill/>
+          </a:ln>
+        </p:spPr>
+        <p:style>
+          <a:lnRef idx="2">
+            <a:schemeClr val="accent2">
+              <a:shade val="50000"/>
+            </a:schemeClr>
+          </a:lnRef>
+          <a:fillRef idx="1">
+            <a:schemeClr val="accent2"/>
+          </a:fillRef>
+          <a:effectRef idx="0">
+            <a:schemeClr val="accent2"/>
+          </a:effectRef>
+          <a:fontRef idx="minor">
+            <a:schemeClr val="lt1"/>
+          </a:fontRef>
+        </p:style>
+        <p:txBody>
+          <a:bodyPr rtlCol="0" anchor="ctr"/>
+          <a:lstStyle/>
+          <a:p>
+            <a:pPr algn="ctr"/>
+            <a:r>
+              <a:rPr lang="en-AU" sz="1400" dirty="0">
+                <a:solidFill>
+                  <a:schemeClr val="tx1"/>
+                </a:solidFill>
+              </a:rPr>
+              <a:t>Motor #2 Feedback</a:t>
+            </a:r>
+          </a:p>
+        </p:txBody>
+      </p:sp>
+      <p:sp>
+        <p:nvSpPr>
+          <p:cNvPr id="10" name="Rectangle 9">
+            <a:extLst>
+              <a:ext uri="{FF2B5EF4-FFF2-40B4-BE49-F238E27FC236}">
+                <a16:creationId xmlns:a16="http://schemas.microsoft.com/office/drawing/2014/main" id="{7120EF97-E2EF-48AA-BF22-9F8915B39E21}"/>
+              </a:ext>
+            </a:extLst>
+          </p:cNvPr>
+          <p:cNvSpPr/>
+          <p:nvPr/>
+        </p:nvSpPr>
+        <p:spPr>
+          <a:xfrm>
+            <a:off x="4815939" y="745535"/>
+            <a:ext cx="1312606" cy="540000"/>
+          </a:xfrm>
+          <a:prstGeom prst="rect">
+            <a:avLst/>
+          </a:prstGeom>
+          <a:solidFill>
+            <a:schemeClr val="accent6"/>
+          </a:solidFill>
+          <a:ln>
+            <a:noFill/>
+          </a:ln>
+        </p:spPr>
+        <p:style>
+          <a:lnRef idx="2">
+            <a:schemeClr val="accent2">
+              <a:shade val="50000"/>
+            </a:schemeClr>
+          </a:lnRef>
+          <a:fillRef idx="1">
+            <a:schemeClr val="accent2"/>
+          </a:fillRef>
+          <a:effectRef idx="0">
+            <a:schemeClr val="accent2"/>
+          </a:effectRef>
+          <a:fontRef idx="minor">
+            <a:schemeClr val="lt1"/>
+          </a:fontRef>
+        </p:style>
+        <p:txBody>
+          <a:bodyPr rtlCol="0" anchor="ctr"/>
+          <a:lstStyle/>
+          <a:p>
+            <a:pPr algn="ctr"/>
+            <a:r>
+              <a:rPr lang="en-AU" sz="1400" dirty="0">
+                <a:solidFill>
+                  <a:schemeClr val="tx1"/>
+                </a:solidFill>
+              </a:rPr>
+              <a:t>Motor #1 Feedback</a:t>
+            </a:r>
+          </a:p>
+        </p:txBody>
+      </p:sp>
+      <p:cxnSp>
+        <p:nvCxnSpPr>
+          <p:cNvPr id="14" name="Connector: Elbow 13">
+            <a:extLst>
+              <a:ext uri="{FF2B5EF4-FFF2-40B4-BE49-F238E27FC236}">
+                <a16:creationId xmlns:a16="http://schemas.microsoft.com/office/drawing/2014/main" id="{24050C8B-DBF0-4468-800D-D65C188050C3}"/>
+              </a:ext>
+            </a:extLst>
+          </p:cNvPr>
+          <p:cNvCxnSpPr>
+            <a:cxnSpLocks/>
+            <a:stCxn id="10" idx="1"/>
+            <a:endCxn id="5" idx="0"/>
+          </p:cNvCxnSpPr>
+          <p:nvPr/>
+        </p:nvCxnSpPr>
+        <p:spPr>
+          <a:xfrm rot="10800000" flipV="1">
+            <a:off x="3745827" y="1015534"/>
+            <a:ext cx="1070112" cy="615749"/>
+          </a:xfrm>
+          <a:prstGeom prst="bentConnector2">
+            <a:avLst/>
+          </a:prstGeom>
+          <a:ln w="12700">
+            <a:tailEnd type="triangle"/>
+          </a:ln>
+        </p:spPr>
+        <p:style>
+          <a:lnRef idx="1">
+            <a:schemeClr val="dk1"/>
+          </a:lnRef>
+          <a:fillRef idx="0">
+            <a:schemeClr val="dk1"/>
+          </a:fillRef>
+          <a:effectRef idx="0">
+            <a:schemeClr val="dk1"/>
+          </a:effectRef>
+          <a:fontRef idx="minor">
+            <a:schemeClr val="tx1"/>
+          </a:fontRef>
+        </p:style>
+      </p:cxnSp>
+      <p:cxnSp>
+        <p:nvCxnSpPr>
+          <p:cNvPr id="16" name="Connector: Elbow 15">
+            <a:extLst>
+              <a:ext uri="{FF2B5EF4-FFF2-40B4-BE49-F238E27FC236}">
+                <a16:creationId xmlns:a16="http://schemas.microsoft.com/office/drawing/2014/main" id="{3DBAF457-909E-480E-BF69-FF00BBF4B675}"/>
+              </a:ext>
+            </a:extLst>
+          </p:cNvPr>
+          <p:cNvCxnSpPr>
+            <a:cxnSpLocks/>
+            <a:stCxn id="9" idx="1"/>
+            <a:endCxn id="5" idx="2"/>
+          </p:cNvCxnSpPr>
+          <p:nvPr/>
+        </p:nvCxnSpPr>
+        <p:spPr>
+          <a:xfrm rot="10800000">
+            <a:off x="3745827" y="2324459"/>
+            <a:ext cx="1070112" cy="647035"/>
+          </a:xfrm>
+          <a:prstGeom prst="bentConnector2">
+            <a:avLst/>
+          </a:prstGeom>
+          <a:ln w="12700">
+            <a:tailEnd type="triangle"/>
+          </a:ln>
+        </p:spPr>
+        <p:style>
+          <a:lnRef idx="1">
+            <a:schemeClr val="dk1"/>
+          </a:lnRef>
+          <a:fillRef idx="0">
+            <a:schemeClr val="dk1"/>
+          </a:fillRef>
+          <a:effectRef idx="0">
+            <a:schemeClr val="dk1"/>
+          </a:effectRef>
+          <a:fontRef idx="minor">
+            <a:schemeClr val="tx1"/>
+          </a:fontRef>
+        </p:style>
+      </p:cxnSp>
+      <p:cxnSp>
+        <p:nvCxnSpPr>
+          <p:cNvPr id="19" name="Connector: Elbow 18">
+            <a:extLst>
+              <a:ext uri="{FF2B5EF4-FFF2-40B4-BE49-F238E27FC236}">
+                <a16:creationId xmlns:a16="http://schemas.microsoft.com/office/drawing/2014/main" id="{8B8ED896-3302-4B17-B04E-FA144F4B5BEA}"/>
+              </a:ext>
+            </a:extLst>
+          </p:cNvPr>
+          <p:cNvCxnSpPr>
+            <a:cxnSpLocks/>
+            <a:stCxn id="5" idx="3"/>
+            <a:endCxn id="8" idx="1"/>
+          </p:cNvCxnSpPr>
+          <p:nvPr/>
+        </p:nvCxnSpPr>
+        <p:spPr>
+          <a:xfrm>
+            <a:off x="4402130" y="1977871"/>
+            <a:ext cx="413809" cy="356995"/>
+          </a:xfrm>
+          <a:prstGeom prst="bentConnector3">
+            <a:avLst>
+              <a:gd name="adj1" fmla="val 50000"/>
+            </a:avLst>
+          </a:prstGeom>
+          <a:ln w="12700">
+            <a:tailEnd type="triangle"/>
+          </a:ln>
+        </p:spPr>
+        <p:style>
+          <a:lnRef idx="1">
+            <a:schemeClr val="dk1"/>
+          </a:lnRef>
+          <a:fillRef idx="0">
+            <a:schemeClr val="dk1"/>
+          </a:fillRef>
+          <a:effectRef idx="0">
+            <a:schemeClr val="dk1"/>
+          </a:effectRef>
+          <a:fontRef idx="minor">
+            <a:schemeClr val="tx1"/>
+          </a:fontRef>
+        </p:style>
+      </p:cxnSp>
+      <p:cxnSp>
+        <p:nvCxnSpPr>
+          <p:cNvPr id="24" name="Connector: Elbow 23">
+            <a:extLst>
+              <a:ext uri="{FF2B5EF4-FFF2-40B4-BE49-F238E27FC236}">
+                <a16:creationId xmlns:a16="http://schemas.microsoft.com/office/drawing/2014/main" id="{460F2B49-CBB1-4D67-AEF9-62FB8A5A670A}"/>
+              </a:ext>
+            </a:extLst>
+          </p:cNvPr>
+          <p:cNvCxnSpPr>
+            <a:cxnSpLocks/>
+            <a:stCxn id="5" idx="3"/>
+            <a:endCxn id="7" idx="1"/>
+          </p:cNvCxnSpPr>
+          <p:nvPr/>
+        </p:nvCxnSpPr>
+        <p:spPr>
+          <a:xfrm flipV="1">
+            <a:off x="4402130" y="1650928"/>
+            <a:ext cx="413809" cy="326943"/>
+          </a:xfrm>
+          <a:prstGeom prst="bentConnector3">
+            <a:avLst>
+              <a:gd name="adj1" fmla="val 50000"/>
+            </a:avLst>
+          </a:prstGeom>
+          <a:ln w="12700">
+            <a:tailEnd type="triangle"/>
+          </a:ln>
+        </p:spPr>
+        <p:style>
+          <a:lnRef idx="1">
+            <a:schemeClr val="dk1"/>
+          </a:lnRef>
+          <a:fillRef idx="0">
+            <a:schemeClr val="dk1"/>
+          </a:fillRef>
+          <a:effectRef idx="0">
+            <a:schemeClr val="dk1"/>
+          </a:effectRef>
+          <a:fontRef idx="minor">
+            <a:schemeClr val="tx1"/>
+          </a:fontRef>
+        </p:style>
+      </p:cxnSp>
+      <p:cxnSp>
+        <p:nvCxnSpPr>
+          <p:cNvPr id="30" name="Straight Arrow Connector 29">
+            <a:extLst>
+              <a:ext uri="{FF2B5EF4-FFF2-40B4-BE49-F238E27FC236}">
+                <a16:creationId xmlns:a16="http://schemas.microsoft.com/office/drawing/2014/main" id="{8A2D36D2-534D-4304-8492-847E3798F319}"/>
+              </a:ext>
+            </a:extLst>
+          </p:cNvPr>
+          <p:cNvCxnSpPr>
+            <a:cxnSpLocks/>
+            <a:stCxn id="4" idx="3"/>
+            <a:endCxn id="5" idx="1"/>
+          </p:cNvCxnSpPr>
+          <p:nvPr/>
+        </p:nvCxnSpPr>
+        <p:spPr>
+          <a:xfrm>
+            <a:off x="2751021" y="1974137"/>
+            <a:ext cx="338503" cy="3734"/>
+          </a:xfrm>
+          <a:prstGeom prst="straightConnector1">
+            <a:avLst/>
+          </a:prstGeom>
+          <a:ln>
+            <a:headEnd type="triangle" w="med" len="med"/>
+            <a:tailEnd type="triangle" w="med" len="med"/>
+          </a:ln>
+        </p:spPr>
+        <p:style>
+          <a:lnRef idx="1">
+            <a:schemeClr val="dk1"/>
+          </a:lnRef>
+          <a:fillRef idx="0">
+            <a:schemeClr val="dk1"/>
+          </a:fillRef>
+          <a:effectRef idx="0">
+            <a:schemeClr val="dk1"/>
+          </a:effectRef>
+          <a:fontRef idx="minor">
+            <a:schemeClr val="tx1"/>
+          </a:fontRef>
+        </p:style>
+      </p:cxnSp>
+      <p:cxnSp>
+        <p:nvCxnSpPr>
+          <p:cNvPr id="33" name="Connector: Elbow 32">
+            <a:extLst>
+              <a:ext uri="{FF2B5EF4-FFF2-40B4-BE49-F238E27FC236}">
+                <a16:creationId xmlns:a16="http://schemas.microsoft.com/office/drawing/2014/main" id="{D911D60F-33D1-497D-9A4E-3A8598DCF3D3}"/>
+              </a:ext>
+            </a:extLst>
+          </p:cNvPr>
+          <p:cNvCxnSpPr>
+            <a:cxnSpLocks/>
+            <a:stCxn id="7" idx="3"/>
+            <a:endCxn id="47" idx="4"/>
+          </p:cNvCxnSpPr>
+          <p:nvPr/>
+        </p:nvCxnSpPr>
+        <p:spPr>
+          <a:xfrm flipV="1">
+            <a:off x="6128545" y="1493485"/>
+            <a:ext cx="444172" cy="157443"/>
+          </a:xfrm>
+          <a:prstGeom prst="bentConnector2">
+            <a:avLst/>
+          </a:prstGeom>
+          <a:ln w="12700">
+            <a:prstDash val="lgDash"/>
+            <a:tailEnd type="triangle"/>
+          </a:ln>
+        </p:spPr>
+        <p:style>
+          <a:lnRef idx="1">
+            <a:schemeClr val="dk1"/>
+          </a:lnRef>
+          <a:fillRef idx="0">
+            <a:schemeClr val="dk1"/>
+          </a:fillRef>
+          <a:effectRef idx="0">
+            <a:schemeClr val="dk1"/>
+          </a:effectRef>
+          <a:fontRef idx="minor">
+            <a:schemeClr val="tx1"/>
+          </a:fontRef>
+        </p:style>
+      </p:cxnSp>
+      <p:cxnSp>
+        <p:nvCxnSpPr>
+          <p:cNvPr id="36" name="Connector: Elbow 35">
+            <a:extLst>
+              <a:ext uri="{FF2B5EF4-FFF2-40B4-BE49-F238E27FC236}">
+                <a16:creationId xmlns:a16="http://schemas.microsoft.com/office/drawing/2014/main" id="{51FCADAF-75FE-444B-8C9C-655CB8AE0735}"/>
+              </a:ext>
+            </a:extLst>
+          </p:cNvPr>
+          <p:cNvCxnSpPr>
+            <a:cxnSpLocks/>
+            <a:stCxn id="8" idx="3"/>
+            <a:endCxn id="57" idx="0"/>
+          </p:cNvCxnSpPr>
+          <p:nvPr/>
+        </p:nvCxnSpPr>
+        <p:spPr>
+          <a:xfrm>
+            <a:off x="6128545" y="2334866"/>
+            <a:ext cx="444171" cy="165244"/>
+          </a:xfrm>
+          <a:prstGeom prst="bentConnector2">
+            <a:avLst/>
+          </a:prstGeom>
+          <a:ln w="12700">
+            <a:prstDash val="lgDash"/>
+            <a:tailEnd type="triangle"/>
+          </a:ln>
+        </p:spPr>
+        <p:style>
+          <a:lnRef idx="1">
+            <a:schemeClr val="dk1"/>
+          </a:lnRef>
+          <a:fillRef idx="0">
+            <a:schemeClr val="dk1"/>
+          </a:fillRef>
+          <a:effectRef idx="0">
+            <a:schemeClr val="dk1"/>
+          </a:effectRef>
+          <a:fontRef idx="minor">
+            <a:schemeClr val="tx1"/>
+          </a:fontRef>
+        </p:style>
+      </p:cxnSp>
+      <p:grpSp>
+        <p:nvGrpSpPr>
+          <p:cNvPr id="49" name="Group 48">
+            <a:extLst>
+              <a:ext uri="{FF2B5EF4-FFF2-40B4-BE49-F238E27FC236}">
+                <a16:creationId xmlns:a16="http://schemas.microsoft.com/office/drawing/2014/main" id="{8F178AA2-C179-41F6-B3D8-6137553C946B}"/>
+              </a:ext>
+            </a:extLst>
+          </p:cNvPr>
+          <p:cNvGrpSpPr/>
+          <p:nvPr/>
+        </p:nvGrpSpPr>
+        <p:grpSpPr>
+          <a:xfrm>
+            <a:off x="6386620" y="1169485"/>
+            <a:ext cx="372193" cy="324000"/>
+            <a:chOff x="7163172" y="1123535"/>
+            <a:chExt cx="372193" cy="324000"/>
+          </a:xfrm>
+        </p:grpSpPr>
+        <p:sp>
+          <p:nvSpPr>
+            <p:cNvPr id="48" name="Rectangle 47">
+              <a:extLst>
+                <a:ext uri="{FF2B5EF4-FFF2-40B4-BE49-F238E27FC236}">
+                  <a16:creationId xmlns:a16="http://schemas.microsoft.com/office/drawing/2014/main" id="{2B777228-4B49-4DA9-B3DA-C35211A6AC19}"/>
+                </a:ext>
+              </a:extLst>
+            </p:cNvPr>
+            <p:cNvSpPr/>
+            <p:nvPr/>
+          </p:nvSpPr>
+          <p:spPr>
+            <a:xfrm>
+              <a:off x="7163172" y="1214312"/>
+              <a:ext cx="372193" cy="142445"/>
+            </a:xfrm>
+            <a:prstGeom prst="rect">
+              <a:avLst/>
+            </a:prstGeom>
+            <a:solidFill>
+              <a:schemeClr val="bg1"/>
+            </a:solidFill>
+            <a:ln>
+              <a:solidFill>
+                <a:schemeClr val="tx1"/>
+              </a:solidFill>
+            </a:ln>
+          </p:spPr>
+          <p:style>
+            <a:lnRef idx="2">
+              <a:schemeClr val="accent1">
+                <a:shade val="50000"/>
+              </a:schemeClr>
+            </a:lnRef>
+            <a:fillRef idx="1">
+              <a:schemeClr val="accent1"/>
+            </a:fillRef>
+            <a:effectRef idx="0">
+              <a:schemeClr val="accent1"/>
+            </a:effectRef>
+            <a:fontRef idx="minor">
+              <a:schemeClr val="lt1"/>
+            </a:fontRef>
+          </p:style>
+          <p:txBody>
+            <a:bodyPr rtlCol="0" anchor="ctr"/>
+            <a:lstStyle/>
+            <a:p>
+              <a:pPr algn="ctr"/>
+              <a:endParaRPr lang="en-AU"/>
+            </a:p>
+          </p:txBody>
+        </p:sp>
+        <p:sp>
+          <p:nvSpPr>
+            <p:cNvPr id="47" name="Oval 46">
+              <a:extLst>
+                <a:ext uri="{FF2B5EF4-FFF2-40B4-BE49-F238E27FC236}">
+                  <a16:creationId xmlns:a16="http://schemas.microsoft.com/office/drawing/2014/main" id="{5EB0E658-CA48-4C94-B01C-4339DDB081FB}"/>
+                </a:ext>
+              </a:extLst>
+            </p:cNvPr>
+            <p:cNvSpPr>
+              <a:spLocks noChangeAspect="1"/>
+            </p:cNvSpPr>
+            <p:nvPr/>
+          </p:nvSpPr>
+          <p:spPr>
+            <a:xfrm>
+              <a:off x="7187269" y="1123535"/>
+              <a:ext cx="324000" cy="324000"/>
+            </a:xfrm>
+            <a:prstGeom prst="ellipse">
+              <a:avLst/>
+            </a:prstGeom>
+            <a:solidFill>
+              <a:schemeClr val="bg1"/>
+            </a:solidFill>
+            <a:ln>
+              <a:solidFill>
+                <a:schemeClr val="tx1"/>
+              </a:solidFill>
+            </a:ln>
+          </p:spPr>
+          <p:style>
+            <a:lnRef idx="2">
+              <a:schemeClr val="accent1">
+                <a:shade val="50000"/>
+              </a:schemeClr>
+            </a:lnRef>
+            <a:fillRef idx="1">
+              <a:schemeClr val="accent1"/>
+            </a:fillRef>
+            <a:effectRef idx="0">
+              <a:schemeClr val="accent1"/>
+            </a:effectRef>
+            <a:fontRef idx="minor">
+              <a:schemeClr val="lt1"/>
+            </a:fontRef>
+          </p:style>
+          <p:txBody>
+            <a:bodyPr rtlCol="0" anchor="ctr"/>
+            <a:lstStyle/>
+            <a:p>
+              <a:pPr algn="ctr"/>
+              <a:r>
+                <a:rPr lang="en-AU" dirty="0">
+                  <a:solidFill>
+                    <a:schemeClr val="tx1"/>
+                  </a:solidFill>
+                </a:rPr>
+                <a:t>M</a:t>
+              </a:r>
+            </a:p>
+          </p:txBody>
+        </p:sp>
+      </p:grpSp>
+      <p:cxnSp>
+        <p:nvCxnSpPr>
+          <p:cNvPr id="51" name="Connector: Elbow 50">
+            <a:extLst>
+              <a:ext uri="{FF2B5EF4-FFF2-40B4-BE49-F238E27FC236}">
+                <a16:creationId xmlns:a16="http://schemas.microsoft.com/office/drawing/2014/main" id="{352F6315-1272-47FA-9F6C-464052D79E53}"/>
+              </a:ext>
+            </a:extLst>
+          </p:cNvPr>
+          <p:cNvCxnSpPr>
+            <a:cxnSpLocks/>
+            <a:stCxn id="47" idx="0"/>
+            <a:endCxn id="10" idx="3"/>
+          </p:cNvCxnSpPr>
+          <p:nvPr/>
+        </p:nvCxnSpPr>
+        <p:spPr>
+          <a:xfrm rot="16200000" flipV="1">
+            <a:off x="6273656" y="870424"/>
+            <a:ext cx="153950" cy="444172"/>
+          </a:xfrm>
+          <a:prstGeom prst="bentConnector2">
+            <a:avLst/>
+          </a:prstGeom>
+          <a:ln w="12700">
+            <a:prstDash val="lgDash"/>
+            <a:tailEnd type="triangle"/>
+          </a:ln>
+        </p:spPr>
+        <p:style>
+          <a:lnRef idx="1">
+            <a:schemeClr val="dk1"/>
+          </a:lnRef>
+          <a:fillRef idx="0">
+            <a:schemeClr val="dk1"/>
+          </a:fillRef>
+          <a:effectRef idx="0">
+            <a:schemeClr val="dk1"/>
+          </a:effectRef>
+          <a:fontRef idx="minor">
+            <a:schemeClr val="tx1"/>
+          </a:fontRef>
+        </p:style>
+      </p:cxnSp>
+      <p:grpSp>
+        <p:nvGrpSpPr>
+          <p:cNvPr id="55" name="Group 54">
+            <a:extLst>
+              <a:ext uri="{FF2B5EF4-FFF2-40B4-BE49-F238E27FC236}">
+                <a16:creationId xmlns:a16="http://schemas.microsoft.com/office/drawing/2014/main" id="{585344CC-C77B-4392-ABC5-5A3BFAEEB0C3}"/>
+              </a:ext>
+            </a:extLst>
+          </p:cNvPr>
+          <p:cNvGrpSpPr/>
+          <p:nvPr/>
+        </p:nvGrpSpPr>
+        <p:grpSpPr>
+          <a:xfrm>
+            <a:off x="6386619" y="2500110"/>
+            <a:ext cx="372193" cy="324000"/>
+            <a:chOff x="7163172" y="1123535"/>
+            <a:chExt cx="372193" cy="324000"/>
+          </a:xfrm>
+        </p:grpSpPr>
+        <p:sp>
+          <p:nvSpPr>
+            <p:cNvPr id="56" name="Rectangle 55">
+              <a:extLst>
+                <a:ext uri="{FF2B5EF4-FFF2-40B4-BE49-F238E27FC236}">
+                  <a16:creationId xmlns:a16="http://schemas.microsoft.com/office/drawing/2014/main" id="{384D8634-F501-4E9D-A20D-C7FE9CF2A15A}"/>
+                </a:ext>
+              </a:extLst>
+            </p:cNvPr>
+            <p:cNvSpPr/>
+            <p:nvPr/>
+          </p:nvSpPr>
+          <p:spPr>
+            <a:xfrm>
+              <a:off x="7163172" y="1214312"/>
+              <a:ext cx="372193" cy="142445"/>
+            </a:xfrm>
+            <a:prstGeom prst="rect">
+              <a:avLst/>
+            </a:prstGeom>
+            <a:solidFill>
+              <a:schemeClr val="bg1"/>
+            </a:solidFill>
+            <a:ln>
+              <a:solidFill>
+                <a:schemeClr val="tx1"/>
+              </a:solidFill>
+            </a:ln>
+          </p:spPr>
+          <p:style>
+            <a:lnRef idx="2">
+              <a:schemeClr val="accent1">
+                <a:shade val="50000"/>
+              </a:schemeClr>
+            </a:lnRef>
+            <a:fillRef idx="1">
+              <a:schemeClr val="accent1"/>
+            </a:fillRef>
+            <a:effectRef idx="0">
+              <a:schemeClr val="accent1"/>
+            </a:effectRef>
+            <a:fontRef idx="minor">
+              <a:schemeClr val="lt1"/>
+            </a:fontRef>
+          </p:style>
+          <p:txBody>
+            <a:bodyPr rtlCol="0" anchor="ctr"/>
+            <a:lstStyle/>
+            <a:p>
+              <a:pPr algn="ctr"/>
+              <a:endParaRPr lang="en-AU"/>
+            </a:p>
+          </p:txBody>
+        </p:sp>
+        <p:sp>
+          <p:nvSpPr>
+            <p:cNvPr id="57" name="Oval 56">
+              <a:extLst>
+                <a:ext uri="{FF2B5EF4-FFF2-40B4-BE49-F238E27FC236}">
+                  <a16:creationId xmlns:a16="http://schemas.microsoft.com/office/drawing/2014/main" id="{552A8982-AA11-4A6F-9ACC-542F82CA6538}"/>
+                </a:ext>
+              </a:extLst>
+            </p:cNvPr>
+            <p:cNvSpPr>
+              <a:spLocks noChangeAspect="1"/>
+            </p:cNvSpPr>
+            <p:nvPr/>
+          </p:nvSpPr>
+          <p:spPr>
+            <a:xfrm>
+              <a:off x="7187269" y="1123535"/>
+              <a:ext cx="324000" cy="324000"/>
+            </a:xfrm>
+            <a:prstGeom prst="ellipse">
+              <a:avLst/>
+            </a:prstGeom>
+            <a:solidFill>
+              <a:schemeClr val="bg1"/>
+            </a:solidFill>
+            <a:ln>
+              <a:solidFill>
+                <a:schemeClr val="tx1"/>
+              </a:solidFill>
+            </a:ln>
+          </p:spPr>
+          <p:style>
+            <a:lnRef idx="2">
+              <a:schemeClr val="accent1">
+                <a:shade val="50000"/>
+              </a:schemeClr>
+            </a:lnRef>
+            <a:fillRef idx="1">
+              <a:schemeClr val="accent1"/>
+            </a:fillRef>
+            <a:effectRef idx="0">
+              <a:schemeClr val="accent1"/>
+            </a:effectRef>
+            <a:fontRef idx="minor">
+              <a:schemeClr val="lt1"/>
+            </a:fontRef>
+          </p:style>
+          <p:txBody>
+            <a:bodyPr rtlCol="0" anchor="ctr"/>
+            <a:lstStyle/>
+            <a:p>
+              <a:pPr algn="ctr"/>
+              <a:r>
+                <a:rPr lang="en-AU" dirty="0">
+                  <a:solidFill>
+                    <a:schemeClr val="tx1"/>
+                  </a:solidFill>
+                </a:rPr>
+                <a:t>M</a:t>
+              </a:r>
+            </a:p>
+          </p:txBody>
+        </p:sp>
+      </p:grpSp>
+      <p:cxnSp>
+        <p:nvCxnSpPr>
+          <p:cNvPr id="59" name="Connector: Elbow 58">
+            <a:extLst>
+              <a:ext uri="{FF2B5EF4-FFF2-40B4-BE49-F238E27FC236}">
+                <a16:creationId xmlns:a16="http://schemas.microsoft.com/office/drawing/2014/main" id="{04398D85-C4B6-4CBC-AC6D-87E0754F0505}"/>
+              </a:ext>
+            </a:extLst>
+          </p:cNvPr>
+          <p:cNvCxnSpPr>
+            <a:cxnSpLocks/>
+            <a:stCxn id="57" idx="4"/>
+            <a:endCxn id="9" idx="3"/>
+          </p:cNvCxnSpPr>
+          <p:nvPr/>
+        </p:nvCxnSpPr>
+        <p:spPr>
+          <a:xfrm rot="5400000">
+            <a:off x="6276940" y="2675716"/>
+            <a:ext cx="147383" cy="444171"/>
+          </a:xfrm>
+          <a:prstGeom prst="bentConnector2">
+            <a:avLst/>
+          </a:prstGeom>
+          <a:ln w="12700">
+            <a:prstDash val="lgDash"/>
+            <a:tailEnd type="triangle"/>
+          </a:ln>
+        </p:spPr>
+        <p:style>
+          <a:lnRef idx="1">
+            <a:schemeClr val="dk1"/>
+          </a:lnRef>
+          <a:fillRef idx="0">
+            <a:schemeClr val="dk1"/>
+          </a:fillRef>
+          <a:effectRef idx="0">
+            <a:schemeClr val="dk1"/>
+          </a:effectRef>
+          <a:fontRef idx="minor">
+            <a:schemeClr val="tx1"/>
+          </a:fontRef>
+        </p:style>
+      </p:cxnSp>
+      <p:sp>
+        <p:nvSpPr>
+          <p:cNvPr id="63" name="Rectangle 62">
+            <a:extLst>
+              <a:ext uri="{FF2B5EF4-FFF2-40B4-BE49-F238E27FC236}">
+                <a16:creationId xmlns:a16="http://schemas.microsoft.com/office/drawing/2014/main" id="{1505FC69-E418-418F-9D7F-24DF840A78C3}"/>
+              </a:ext>
+            </a:extLst>
+          </p:cNvPr>
+          <p:cNvSpPr/>
+          <p:nvPr/>
+        </p:nvSpPr>
+        <p:spPr>
+          <a:xfrm>
+            <a:off x="1448767" y="2701493"/>
+            <a:ext cx="1312606" cy="540000"/>
+          </a:xfrm>
+          <a:prstGeom prst="rect">
+            <a:avLst/>
+          </a:prstGeom>
+          <a:solidFill>
+            <a:schemeClr val="accent6"/>
+          </a:solidFill>
+          <a:ln>
+            <a:noFill/>
+          </a:ln>
+        </p:spPr>
+        <p:style>
+          <a:lnRef idx="2">
+            <a:schemeClr val="accent2">
+              <a:shade val="50000"/>
+            </a:schemeClr>
+          </a:lnRef>
+          <a:fillRef idx="1">
+            <a:schemeClr val="accent2"/>
+          </a:fillRef>
+          <a:effectRef idx="0">
+            <a:schemeClr val="accent2"/>
+          </a:effectRef>
+          <a:fontRef idx="minor">
+            <a:schemeClr val="lt1"/>
+          </a:fontRef>
+        </p:style>
+        <p:txBody>
+          <a:bodyPr rtlCol="0" anchor="ctr"/>
+          <a:lstStyle/>
+          <a:p>
+            <a:pPr algn="ctr"/>
+            <a:r>
+              <a:rPr lang="en-AU" sz="1400" dirty="0">
+                <a:solidFill>
+                  <a:schemeClr val="tx1"/>
+                </a:solidFill>
+              </a:rPr>
+              <a:t>Sensors</a:t>
+            </a:r>
+          </a:p>
+        </p:txBody>
+      </p:sp>
+      <p:cxnSp>
+        <p:nvCxnSpPr>
+          <p:cNvPr id="64" name="Straight Arrow Connector 63">
+            <a:extLst>
+              <a:ext uri="{FF2B5EF4-FFF2-40B4-BE49-F238E27FC236}">
+                <a16:creationId xmlns:a16="http://schemas.microsoft.com/office/drawing/2014/main" id="{D1731AD6-7E83-4D10-B53C-4310DC22AF2C}"/>
+              </a:ext>
+            </a:extLst>
+          </p:cNvPr>
+          <p:cNvCxnSpPr>
+            <a:cxnSpLocks/>
+            <a:stCxn id="4" idx="2"/>
+            <a:endCxn id="63" idx="0"/>
+          </p:cNvCxnSpPr>
+          <p:nvPr/>
+        </p:nvCxnSpPr>
+        <p:spPr>
+          <a:xfrm>
+            <a:off x="2094718" y="2320724"/>
+            <a:ext cx="10352" cy="380769"/>
+          </a:xfrm>
+          <a:prstGeom prst="straightConnector1">
+            <a:avLst/>
+          </a:prstGeom>
+          <a:ln>
+            <a:headEnd type="triangle" w="med" len="med"/>
+            <a:tailEnd type="triangle" w="med" len="med"/>
+          </a:ln>
+        </p:spPr>
+        <p:style>
+          <a:lnRef idx="1">
+            <a:schemeClr val="dk1"/>
+          </a:lnRef>
+          <a:fillRef idx="0">
+            <a:schemeClr val="dk1"/>
+          </a:fillRef>
+          <a:effectRef idx="0">
+            <a:schemeClr val="dk1"/>
+          </a:effectRef>
+          <a:fontRef idx="minor">
+            <a:schemeClr val="tx1"/>
+          </a:fontRef>
+        </p:style>
+      </p:cxnSp>
+      <p:sp>
+        <p:nvSpPr>
+          <p:cNvPr id="69" name="Rectangle 68">
+            <a:extLst>
+              <a:ext uri="{FF2B5EF4-FFF2-40B4-BE49-F238E27FC236}">
+                <a16:creationId xmlns:a16="http://schemas.microsoft.com/office/drawing/2014/main" id="{5C7C31B9-D34E-4A91-A318-75DCCC9A04D4}"/>
+              </a:ext>
+            </a:extLst>
+          </p:cNvPr>
+          <p:cNvSpPr/>
+          <p:nvPr/>
+        </p:nvSpPr>
+        <p:spPr>
+          <a:xfrm>
+            <a:off x="1438415" y="740963"/>
+            <a:ext cx="1312606" cy="540000"/>
+          </a:xfrm>
+          <a:prstGeom prst="rect">
+            <a:avLst/>
+          </a:prstGeom>
+          <a:solidFill>
+            <a:schemeClr val="accent2"/>
+          </a:solidFill>
+          <a:ln>
+            <a:noFill/>
+          </a:ln>
+        </p:spPr>
+        <p:style>
+          <a:lnRef idx="2">
+            <a:schemeClr val="accent2">
+              <a:shade val="50000"/>
+            </a:schemeClr>
+          </a:lnRef>
+          <a:fillRef idx="1">
+            <a:schemeClr val="accent2"/>
+          </a:fillRef>
+          <a:effectRef idx="0">
+            <a:schemeClr val="accent2"/>
+          </a:effectRef>
+          <a:fontRef idx="minor">
+            <a:schemeClr val="lt1"/>
+          </a:fontRef>
+        </p:style>
+        <p:txBody>
+          <a:bodyPr rtlCol="0" anchor="ctr"/>
+          <a:lstStyle/>
+          <a:p>
+            <a:pPr algn="ctr"/>
+            <a:r>
+              <a:rPr lang="en-AU" sz="1400" dirty="0">
+                <a:solidFill>
+                  <a:schemeClr val="tx1"/>
+                </a:solidFill>
+              </a:rPr>
+              <a:t>User Controls</a:t>
+            </a:r>
+          </a:p>
+        </p:txBody>
+      </p:sp>
+      <p:cxnSp>
+        <p:nvCxnSpPr>
+          <p:cNvPr id="73" name="Straight Arrow Connector 72">
+            <a:extLst>
+              <a:ext uri="{FF2B5EF4-FFF2-40B4-BE49-F238E27FC236}">
+                <a16:creationId xmlns:a16="http://schemas.microsoft.com/office/drawing/2014/main" id="{7DAED6D3-533D-440D-ADDF-608FA9D3836D}"/>
+              </a:ext>
+            </a:extLst>
+          </p:cNvPr>
+          <p:cNvCxnSpPr>
+            <a:cxnSpLocks/>
+            <a:stCxn id="4" idx="0"/>
+            <a:endCxn id="69" idx="2"/>
+          </p:cNvCxnSpPr>
+          <p:nvPr/>
+        </p:nvCxnSpPr>
+        <p:spPr>
+          <a:xfrm flipV="1">
+            <a:off x="2094718" y="1280963"/>
+            <a:ext cx="0" cy="346587"/>
+          </a:xfrm>
+          <a:prstGeom prst="straightConnector1">
+            <a:avLst/>
+          </a:prstGeom>
+          <a:ln w="12700">
+            <a:solidFill>
+              <a:schemeClr val="tx1"/>
+            </a:solidFill>
+            <a:headEnd type="triangle"/>
+            <a:tailEnd type="triangle"/>
+          </a:ln>
+        </p:spPr>
+        <p:style>
+          <a:lnRef idx="1">
+            <a:schemeClr val="accent1"/>
+          </a:lnRef>
+          <a:fillRef idx="0">
+            <a:schemeClr val="accent1"/>
+          </a:fillRef>
+          <a:effectRef idx="0">
+            <a:schemeClr val="accent1"/>
+          </a:effectRef>
+          <a:fontRef idx="minor">
+            <a:schemeClr val="tx1"/>
+          </a:fontRef>
+        </p:style>
+      </p:cxnSp>
+    </p:spTree>
+    <p:extLst>
+      <p:ext uri="{BB962C8B-B14F-4D97-AF65-F5344CB8AC3E}">
+        <p14:creationId xmlns:p14="http://schemas.microsoft.com/office/powerpoint/2010/main" val="1702773309"/>
+      </p:ext>
+    </p:extLst>
+  </p:cSld>
+  <p:clrMapOvr>
+    <a:masterClrMapping/>
+  </p:clrMapOvr>
+</p:sld>
+</file>
+
+<file path=ppt/slides/slide2.xml><?xml version="1.0" encoding="utf-8"?>
 <p:sld xmlns:a="http://schemas.openxmlformats.org/drawingml/2006/main" xmlns:r="http://schemas.openxmlformats.org/officeDocument/2006/relationships" xmlns:p="http://schemas.openxmlformats.org/presentationml/2006/main">
   <p:cSld>
     <p:spTree>
@@ -4828,13 +6074,13 @@
             <p:nvPr/>
           </p:nvSpPr>
           <p:spPr>
-            <a:xfrm rot="326977">
+            <a:xfrm rot="4474356" flipH="1">
               <a:off x="6122797" y="2616177"/>
               <a:ext cx="384723" cy="384723"/>
             </a:xfrm>
             <a:prstGeom prst="arc">
               <a:avLst>
-                <a:gd name="adj1" fmla="val 7478806"/>
+                <a:gd name="adj1" fmla="val 11309142"/>
                 <a:gd name="adj2" fmla="val 18253916"/>
               </a:avLst>
             </a:prstGeom>
@@ -4924,7 +6170,7 @@
           </p:nvSpPr>
           <p:spPr>
             <a:xfrm>
-              <a:off x="6103037" y="2318946"/>
+              <a:off x="6425764" y="2442660"/>
               <a:ext cx="562975" cy="369332"/>
             </a:xfrm>
             <a:prstGeom prst="rect">
@@ -5278,8 +6524,8 @@
           </p:nvSpPr>
           <p:spPr>
             <a:xfrm>
-              <a:off x="5840013" y="3052742"/>
-              <a:ext cx="282450" cy="369332"/>
+              <a:off x="5793713" y="3052742"/>
+              <a:ext cx="309700" cy="369332"/>
             </a:xfrm>
             <a:prstGeom prst="rect">
               <a:avLst/>
@@ -5298,7 +6544,7 @@
                     <a:srgbClr val="00B050"/>
                   </a:solidFill>
                 </a:rPr>
-                <a:t>L</a:t>
+                <a:t>B</a:t>
               </a:r>
             </a:p>
           </p:txBody>
@@ -5428,7 +6674,7 @@
           </p:nvSpPr>
           <p:spPr>
             <a:xfrm>
-              <a:off x="5104171" y="4596043"/>
+              <a:off x="5104171" y="5069383"/>
               <a:ext cx="562975" cy="369332"/>
             </a:xfrm>
             <a:prstGeom prst="rect">
@@ -5859,13 +7105,13 @@
               <p:nvPr/>
             </p:nvSpPr>
             <p:spPr>
-              <a:xfrm rot="326977">
-                <a:off x="5054039" y="5028228"/>
+              <a:xfrm rot="4297737" flipH="1">
+                <a:off x="5054040" y="5028228"/>
                 <a:ext cx="384723" cy="384723"/>
               </a:xfrm>
               <a:prstGeom prst="arc">
                 <a:avLst>
-                  <a:gd name="adj1" fmla="val 7478806"/>
+                  <a:gd name="adj1" fmla="val 11148384"/>
                   <a:gd name="adj2" fmla="val 18253916"/>
                 </a:avLst>
               </a:prstGeom>
@@ -6574,6 +7820,657 @@
           </a:p>
         </p:txBody>
       </p:sp>
+      <p:grpSp>
+        <p:nvGrpSpPr>
+          <p:cNvPr id="96" name="Group 95">
+            <a:extLst>
+              <a:ext uri="{FF2B5EF4-FFF2-40B4-BE49-F238E27FC236}">
+                <a16:creationId xmlns:a16="http://schemas.microsoft.com/office/drawing/2014/main" id="{87052C76-10A3-460F-BF40-39F444FDBDCC}"/>
+              </a:ext>
+            </a:extLst>
+          </p:cNvPr>
+          <p:cNvGrpSpPr/>
+          <p:nvPr/>
+        </p:nvGrpSpPr>
+        <p:grpSpPr>
+          <a:xfrm>
+            <a:off x="8211093" y="730112"/>
+            <a:ext cx="2145156" cy="2314449"/>
+            <a:chOff x="4206251" y="695387"/>
+            <a:chExt cx="2145156" cy="2314449"/>
+          </a:xfrm>
+        </p:grpSpPr>
+        <p:sp>
+          <p:nvSpPr>
+            <p:cNvPr id="98" name="Rectangle 97">
+              <a:extLst>
+                <a:ext uri="{FF2B5EF4-FFF2-40B4-BE49-F238E27FC236}">
+                  <a16:creationId xmlns:a16="http://schemas.microsoft.com/office/drawing/2014/main" id="{90BC21B3-84E3-461F-AB69-0469020C3683}"/>
+                </a:ext>
+              </a:extLst>
+            </p:cNvPr>
+            <p:cNvSpPr/>
+            <p:nvPr/>
+          </p:nvSpPr>
+          <p:spPr>
+            <a:xfrm>
+              <a:off x="5287092" y="1850186"/>
+              <a:ext cx="890343" cy="902944"/>
+            </a:xfrm>
+            <a:prstGeom prst="rect">
+              <a:avLst/>
+            </a:prstGeom>
+            <a:solidFill>
+              <a:schemeClr val="accent4">
+                <a:lumMod val="40000"/>
+                <a:lumOff val="60000"/>
+                <a:alpha val="10000"/>
+              </a:schemeClr>
+            </a:solidFill>
+            <a:ln>
+              <a:noFill/>
+            </a:ln>
+          </p:spPr>
+          <p:style>
+            <a:lnRef idx="2">
+              <a:schemeClr val="accent1">
+                <a:shade val="50000"/>
+              </a:schemeClr>
+            </a:lnRef>
+            <a:fillRef idx="1">
+              <a:schemeClr val="accent1"/>
+            </a:fillRef>
+            <a:effectRef idx="0">
+              <a:schemeClr val="accent1"/>
+            </a:effectRef>
+            <a:fontRef idx="minor">
+              <a:schemeClr val="lt1"/>
+            </a:fontRef>
+          </p:style>
+          <p:txBody>
+            <a:bodyPr rtlCol="0" anchor="ctr"/>
+            <a:lstStyle/>
+            <a:p>
+              <a:pPr algn="ctr"/>
+              <a:endParaRPr lang="en-AU"/>
+            </a:p>
+          </p:txBody>
+        </p:sp>
+        <p:sp>
+          <p:nvSpPr>
+            <p:cNvPr id="99" name="Rectangle 98">
+              <a:extLst>
+                <a:ext uri="{FF2B5EF4-FFF2-40B4-BE49-F238E27FC236}">
+                  <a16:creationId xmlns:a16="http://schemas.microsoft.com/office/drawing/2014/main" id="{19D25055-E472-4E20-A17F-0FF1B0ABDC32}"/>
+                </a:ext>
+              </a:extLst>
+            </p:cNvPr>
+            <p:cNvSpPr/>
+            <p:nvPr/>
+          </p:nvSpPr>
+          <p:spPr>
+            <a:xfrm>
+              <a:off x="5286083" y="936698"/>
+              <a:ext cx="890343" cy="902944"/>
+            </a:xfrm>
+            <a:prstGeom prst="rect">
+              <a:avLst/>
+            </a:prstGeom>
+            <a:solidFill>
+              <a:schemeClr val="accent4">
+                <a:lumMod val="40000"/>
+                <a:lumOff val="60000"/>
+                <a:alpha val="10000"/>
+              </a:schemeClr>
+            </a:solidFill>
+            <a:ln>
+              <a:noFill/>
+            </a:ln>
+          </p:spPr>
+          <p:style>
+            <a:lnRef idx="2">
+              <a:schemeClr val="accent1">
+                <a:shade val="50000"/>
+              </a:schemeClr>
+            </a:lnRef>
+            <a:fillRef idx="1">
+              <a:schemeClr val="accent1"/>
+            </a:fillRef>
+            <a:effectRef idx="0">
+              <a:schemeClr val="accent1"/>
+            </a:effectRef>
+            <a:fontRef idx="minor">
+              <a:schemeClr val="lt1"/>
+            </a:fontRef>
+          </p:style>
+          <p:txBody>
+            <a:bodyPr rtlCol="0" anchor="ctr"/>
+            <a:lstStyle/>
+            <a:p>
+              <a:pPr algn="ctr"/>
+              <a:endParaRPr lang="en-AU"/>
+            </a:p>
+          </p:txBody>
+        </p:sp>
+        <p:sp>
+          <p:nvSpPr>
+            <p:cNvPr id="101" name="Rectangle 100">
+              <a:extLst>
+                <a:ext uri="{FF2B5EF4-FFF2-40B4-BE49-F238E27FC236}">
+                  <a16:creationId xmlns:a16="http://schemas.microsoft.com/office/drawing/2014/main" id="{C51DB27B-7BFC-4522-9FD6-FDA3E2B728F8}"/>
+                </a:ext>
+              </a:extLst>
+            </p:cNvPr>
+            <p:cNvSpPr/>
+            <p:nvPr/>
+          </p:nvSpPr>
+          <p:spPr>
+            <a:xfrm>
+              <a:off x="4384492" y="936698"/>
+              <a:ext cx="890343" cy="902944"/>
+            </a:xfrm>
+            <a:prstGeom prst="rect">
+              <a:avLst/>
+            </a:prstGeom>
+            <a:solidFill>
+              <a:schemeClr val="accent4">
+                <a:lumMod val="40000"/>
+                <a:lumOff val="60000"/>
+                <a:alpha val="10000"/>
+              </a:schemeClr>
+            </a:solidFill>
+            <a:ln>
+              <a:noFill/>
+            </a:ln>
+          </p:spPr>
+          <p:style>
+            <a:lnRef idx="2">
+              <a:schemeClr val="accent1">
+                <a:shade val="50000"/>
+              </a:schemeClr>
+            </a:lnRef>
+            <a:fillRef idx="1">
+              <a:schemeClr val="accent1"/>
+            </a:fillRef>
+            <a:effectRef idx="0">
+              <a:schemeClr val="accent1"/>
+            </a:effectRef>
+            <a:fontRef idx="minor">
+              <a:schemeClr val="lt1"/>
+            </a:fontRef>
+          </p:style>
+          <p:txBody>
+            <a:bodyPr rtlCol="0" anchor="ctr"/>
+            <a:lstStyle/>
+            <a:p>
+              <a:pPr algn="ctr"/>
+              <a:endParaRPr lang="en-AU"/>
+            </a:p>
+          </p:txBody>
+        </p:sp>
+        <p:sp>
+          <p:nvSpPr>
+            <p:cNvPr id="103" name="Rectangle 102">
+              <a:extLst>
+                <a:ext uri="{FF2B5EF4-FFF2-40B4-BE49-F238E27FC236}">
+                  <a16:creationId xmlns:a16="http://schemas.microsoft.com/office/drawing/2014/main" id="{6B394D27-7FCD-4D79-9B93-5193F83CDDDE}"/>
+                </a:ext>
+              </a:extLst>
+            </p:cNvPr>
+            <p:cNvSpPr/>
+            <p:nvPr/>
+          </p:nvSpPr>
+          <p:spPr>
+            <a:xfrm>
+              <a:off x="4385217" y="1851817"/>
+              <a:ext cx="890343" cy="902944"/>
+            </a:xfrm>
+            <a:prstGeom prst="rect">
+              <a:avLst/>
+            </a:prstGeom>
+            <a:solidFill>
+              <a:schemeClr val="accent4">
+                <a:lumMod val="40000"/>
+                <a:lumOff val="60000"/>
+                <a:alpha val="10000"/>
+              </a:schemeClr>
+            </a:solidFill>
+            <a:ln>
+              <a:noFill/>
+            </a:ln>
+          </p:spPr>
+          <p:style>
+            <a:lnRef idx="2">
+              <a:schemeClr val="accent1">
+                <a:shade val="50000"/>
+              </a:schemeClr>
+            </a:lnRef>
+            <a:fillRef idx="1">
+              <a:schemeClr val="accent1"/>
+            </a:fillRef>
+            <a:effectRef idx="0">
+              <a:schemeClr val="accent1"/>
+            </a:effectRef>
+            <a:fontRef idx="minor">
+              <a:schemeClr val="lt1"/>
+            </a:fontRef>
+          </p:style>
+          <p:txBody>
+            <a:bodyPr rtlCol="0" anchor="ctr"/>
+            <a:lstStyle/>
+            <a:p>
+              <a:pPr algn="ctr"/>
+              <a:endParaRPr lang="en-AU"/>
+            </a:p>
+          </p:txBody>
+        </p:sp>
+        <p:sp>
+          <p:nvSpPr>
+            <p:cNvPr id="105" name="TextBox 104">
+              <a:extLst>
+                <a:ext uri="{FF2B5EF4-FFF2-40B4-BE49-F238E27FC236}">
+                  <a16:creationId xmlns:a16="http://schemas.microsoft.com/office/drawing/2014/main" id="{57DAEDAC-2732-43E4-B169-40D43CACE947}"/>
+                </a:ext>
+              </a:extLst>
+            </p:cNvPr>
+            <p:cNvSpPr txBox="1"/>
+            <p:nvPr/>
+          </p:nvSpPr>
+          <p:spPr>
+            <a:xfrm>
+              <a:off x="5242424" y="695387"/>
+              <a:ext cx="431528" cy="369332"/>
+            </a:xfrm>
+            <a:prstGeom prst="rect">
+              <a:avLst/>
+            </a:prstGeom>
+            <a:noFill/>
+          </p:spPr>
+          <p:txBody>
+            <a:bodyPr wrap="none" rtlCol="0">
+              <a:spAutoFit/>
+            </a:bodyPr>
+            <a:lstStyle/>
+            <a:p>
+              <a:r>
+                <a:rPr lang="en-AU" dirty="0"/>
+                <a:t>+V</a:t>
+              </a:r>
+              <a:endParaRPr lang="en-AU" baseline="-25000" dirty="0"/>
+            </a:p>
+          </p:txBody>
+        </p:sp>
+        <p:sp>
+          <p:nvSpPr>
+            <p:cNvPr id="113" name="Oval 112">
+              <a:extLst>
+                <a:ext uri="{FF2B5EF4-FFF2-40B4-BE49-F238E27FC236}">
+                  <a16:creationId xmlns:a16="http://schemas.microsoft.com/office/drawing/2014/main" id="{694352C4-CA0C-4525-BBF8-CF694D066ABA}"/>
+                </a:ext>
+              </a:extLst>
+            </p:cNvPr>
+            <p:cNvSpPr/>
+            <p:nvPr/>
+          </p:nvSpPr>
+          <p:spPr>
+            <a:xfrm>
+              <a:off x="5242424" y="1809804"/>
+              <a:ext cx="72000" cy="72000"/>
+            </a:xfrm>
+            <a:prstGeom prst="ellipse">
+              <a:avLst/>
+            </a:prstGeom>
+            <a:noFill/>
+            <a:ln>
+              <a:solidFill>
+                <a:schemeClr val="tx1"/>
+              </a:solidFill>
+            </a:ln>
+          </p:spPr>
+          <p:style>
+            <a:lnRef idx="2">
+              <a:schemeClr val="accent1">
+                <a:shade val="50000"/>
+              </a:schemeClr>
+            </a:lnRef>
+            <a:fillRef idx="1">
+              <a:schemeClr val="accent1"/>
+            </a:fillRef>
+            <a:effectRef idx="0">
+              <a:schemeClr val="accent1"/>
+            </a:effectRef>
+            <a:fontRef idx="minor">
+              <a:schemeClr val="lt1"/>
+            </a:fontRef>
+          </p:style>
+          <p:txBody>
+            <a:bodyPr rtlCol="0" anchor="ctr"/>
+            <a:lstStyle/>
+            <a:p>
+              <a:pPr algn="ctr"/>
+              <a:endParaRPr lang="en-AU"/>
+            </a:p>
+          </p:txBody>
+        </p:sp>
+        <p:cxnSp>
+          <p:nvCxnSpPr>
+            <p:cNvPr id="114" name="Straight Connector 113">
+              <a:extLst>
+                <a:ext uri="{FF2B5EF4-FFF2-40B4-BE49-F238E27FC236}">
+                  <a16:creationId xmlns:a16="http://schemas.microsoft.com/office/drawing/2014/main" id="{C81A103F-C076-401B-8866-7290FF8DDEDF}"/>
+                </a:ext>
+              </a:extLst>
+            </p:cNvPr>
+            <p:cNvCxnSpPr>
+              <a:cxnSpLocks/>
+            </p:cNvCxnSpPr>
+            <p:nvPr/>
+          </p:nvCxnSpPr>
+          <p:spPr>
+            <a:xfrm>
+              <a:off x="4206251" y="1839642"/>
+              <a:ext cx="2145156" cy="12325"/>
+            </a:xfrm>
+            <a:prstGeom prst="line">
+              <a:avLst/>
+            </a:prstGeom>
+            <a:ln>
+              <a:solidFill>
+                <a:schemeClr val="tx1"/>
+              </a:solidFill>
+              <a:headEnd type="triangle"/>
+              <a:tailEnd type="triangle"/>
+            </a:ln>
+          </p:spPr>
+          <p:style>
+            <a:lnRef idx="1">
+              <a:schemeClr val="accent1"/>
+            </a:lnRef>
+            <a:fillRef idx="0">
+              <a:schemeClr val="accent1"/>
+            </a:fillRef>
+            <a:effectRef idx="0">
+              <a:schemeClr val="accent1"/>
+            </a:effectRef>
+            <a:fontRef idx="minor">
+              <a:schemeClr val="tx1"/>
+            </a:fontRef>
+          </p:style>
+        </p:cxnSp>
+        <p:cxnSp>
+          <p:nvCxnSpPr>
+            <p:cNvPr id="115" name="Straight Connector 114">
+              <a:extLst>
+                <a:ext uri="{FF2B5EF4-FFF2-40B4-BE49-F238E27FC236}">
+                  <a16:creationId xmlns:a16="http://schemas.microsoft.com/office/drawing/2014/main" id="{1C1C1268-F935-4818-9C9E-4FFA0D6F4F29}"/>
+                </a:ext>
+              </a:extLst>
+            </p:cNvPr>
+            <p:cNvCxnSpPr>
+              <a:cxnSpLocks/>
+            </p:cNvCxnSpPr>
+            <p:nvPr/>
+          </p:nvCxnSpPr>
+          <p:spPr>
+            <a:xfrm>
+              <a:off x="5278829" y="801395"/>
+              <a:ext cx="0" cy="2088818"/>
+            </a:xfrm>
+            <a:prstGeom prst="line">
+              <a:avLst/>
+            </a:prstGeom>
+            <a:ln>
+              <a:solidFill>
+                <a:schemeClr val="tx1"/>
+              </a:solidFill>
+              <a:headEnd type="triangle"/>
+              <a:tailEnd type="triangle"/>
+            </a:ln>
+          </p:spPr>
+          <p:style>
+            <a:lnRef idx="1">
+              <a:schemeClr val="accent1"/>
+            </a:lnRef>
+            <a:fillRef idx="0">
+              <a:schemeClr val="accent1"/>
+            </a:fillRef>
+            <a:effectRef idx="0">
+              <a:schemeClr val="accent1"/>
+            </a:effectRef>
+            <a:fontRef idx="minor">
+              <a:schemeClr val="tx1"/>
+            </a:fontRef>
+          </p:style>
+        </p:cxnSp>
+        <p:sp>
+          <p:nvSpPr>
+            <p:cNvPr id="116" name="Arrow: Curved Right 115">
+              <a:extLst>
+                <a:ext uri="{FF2B5EF4-FFF2-40B4-BE49-F238E27FC236}">
+                  <a16:creationId xmlns:a16="http://schemas.microsoft.com/office/drawing/2014/main" id="{EFDB4EC3-E6E2-4991-A850-283F0D0CD776}"/>
+                </a:ext>
+              </a:extLst>
+            </p:cNvPr>
+            <p:cNvSpPr/>
+            <p:nvPr/>
+          </p:nvSpPr>
+          <p:spPr>
+            <a:xfrm>
+              <a:off x="5044962" y="1679821"/>
+              <a:ext cx="144000" cy="360000"/>
+            </a:xfrm>
+            <a:prstGeom prst="curvedRightArrow">
+              <a:avLst/>
+            </a:prstGeom>
+            <a:solidFill>
+              <a:schemeClr val="tx1"/>
+            </a:solidFill>
+            <a:ln>
+              <a:noFill/>
+            </a:ln>
+          </p:spPr>
+          <p:style>
+            <a:lnRef idx="2">
+              <a:schemeClr val="accent1">
+                <a:shade val="50000"/>
+              </a:schemeClr>
+            </a:lnRef>
+            <a:fillRef idx="1">
+              <a:schemeClr val="accent1"/>
+            </a:fillRef>
+            <a:effectRef idx="0">
+              <a:schemeClr val="accent1"/>
+            </a:effectRef>
+            <a:fontRef idx="minor">
+              <a:schemeClr val="lt1"/>
+            </a:fontRef>
+          </p:style>
+          <p:txBody>
+            <a:bodyPr rtlCol="0" anchor="ctr"/>
+            <a:lstStyle/>
+            <a:p>
+              <a:pPr algn="ctr"/>
+              <a:endParaRPr lang="en-AU">
+                <a:solidFill>
+                  <a:schemeClr val="tx1"/>
+                </a:solidFill>
+              </a:endParaRPr>
+            </a:p>
+          </p:txBody>
+        </p:sp>
+        <p:sp>
+          <p:nvSpPr>
+            <p:cNvPr id="117" name="Arrow: Curved Left 116">
+              <a:extLst>
+                <a:ext uri="{FF2B5EF4-FFF2-40B4-BE49-F238E27FC236}">
+                  <a16:creationId xmlns:a16="http://schemas.microsoft.com/office/drawing/2014/main" id="{246856A7-2F29-468D-A8E4-236BA7691329}"/>
+                </a:ext>
+              </a:extLst>
+            </p:cNvPr>
+            <p:cNvSpPr/>
+            <p:nvPr/>
+          </p:nvSpPr>
+          <p:spPr>
+            <a:xfrm>
+              <a:off x="5367886" y="1679821"/>
+              <a:ext cx="142036" cy="360000"/>
+            </a:xfrm>
+            <a:prstGeom prst="curvedLeftArrow">
+              <a:avLst/>
+            </a:prstGeom>
+            <a:solidFill>
+              <a:schemeClr val="tx1"/>
+            </a:solidFill>
+            <a:ln>
+              <a:noFill/>
+            </a:ln>
+          </p:spPr>
+          <p:style>
+            <a:lnRef idx="2">
+              <a:schemeClr val="accent1">
+                <a:shade val="50000"/>
+              </a:schemeClr>
+            </a:lnRef>
+            <a:fillRef idx="1">
+              <a:schemeClr val="accent1"/>
+            </a:fillRef>
+            <a:effectRef idx="0">
+              <a:schemeClr val="accent1"/>
+            </a:effectRef>
+            <a:fontRef idx="minor">
+              <a:schemeClr val="lt1"/>
+            </a:fontRef>
+          </p:style>
+          <p:txBody>
+            <a:bodyPr rtlCol="0" anchor="ctr"/>
+            <a:lstStyle/>
+            <a:p>
+              <a:pPr algn="ctr"/>
+              <a:endParaRPr lang="en-AU">
+                <a:solidFill>
+                  <a:schemeClr val="tx1"/>
+                </a:solidFill>
+              </a:endParaRPr>
+            </a:p>
+          </p:txBody>
+        </p:sp>
+        <p:sp>
+          <p:nvSpPr>
+            <p:cNvPr id="118" name="TextBox 117">
+              <a:extLst>
+                <a:ext uri="{FF2B5EF4-FFF2-40B4-BE49-F238E27FC236}">
+                  <a16:creationId xmlns:a16="http://schemas.microsoft.com/office/drawing/2014/main" id="{DECA7A6C-3455-4B6F-8D1E-280DEEA80E1E}"/>
+                </a:ext>
+              </a:extLst>
+            </p:cNvPr>
+            <p:cNvSpPr txBox="1"/>
+            <p:nvPr/>
+          </p:nvSpPr>
+          <p:spPr>
+            <a:xfrm>
+              <a:off x="5399388" y="1499096"/>
+              <a:ext cx="460382" cy="369332"/>
+            </a:xfrm>
+            <a:prstGeom prst="rect">
+              <a:avLst/>
+            </a:prstGeom>
+            <a:noFill/>
+          </p:spPr>
+          <p:txBody>
+            <a:bodyPr wrap="none" rtlCol="0">
+              <a:spAutoFit/>
+            </a:bodyPr>
+            <a:lstStyle/>
+            <a:p>
+              <a:r>
+                <a:rPr lang="en-AU" dirty="0"/>
+                <a:t>+</a:t>
+              </a:r>
+              <a:r>
+                <a:rPr lang="el-GR" dirty="0"/>
+                <a:t>ω</a:t>
+              </a:r>
+              <a:endParaRPr lang="en-AU" dirty="0"/>
+            </a:p>
+          </p:txBody>
+        </p:sp>
+        <p:sp>
+          <p:nvSpPr>
+            <p:cNvPr id="127" name="TextBox 126">
+              <a:extLst>
+                <a:ext uri="{FF2B5EF4-FFF2-40B4-BE49-F238E27FC236}">
+                  <a16:creationId xmlns:a16="http://schemas.microsoft.com/office/drawing/2014/main" id="{34D053B8-7045-4486-A51E-6AF324FFB7E6}"/>
+                </a:ext>
+              </a:extLst>
+            </p:cNvPr>
+            <p:cNvSpPr txBox="1"/>
+            <p:nvPr/>
+          </p:nvSpPr>
+          <p:spPr>
+            <a:xfrm>
+              <a:off x="4732971" y="1499097"/>
+              <a:ext cx="415498" cy="369332"/>
+            </a:xfrm>
+            <a:prstGeom prst="rect">
+              <a:avLst/>
+            </a:prstGeom>
+            <a:noFill/>
+          </p:spPr>
+          <p:txBody>
+            <a:bodyPr wrap="none" rtlCol="0">
+              <a:spAutoFit/>
+            </a:bodyPr>
+            <a:lstStyle/>
+            <a:p>
+              <a:r>
+                <a:rPr lang="en-AU" dirty="0"/>
+                <a:t>-</a:t>
+              </a:r>
+              <a:r>
+                <a:rPr lang="el-GR" dirty="0"/>
+                <a:t>ω</a:t>
+              </a:r>
+              <a:endParaRPr lang="en-AU" dirty="0"/>
+            </a:p>
+          </p:txBody>
+        </p:sp>
+        <p:sp>
+          <p:nvSpPr>
+            <p:cNvPr id="151" name="TextBox 150">
+              <a:extLst>
+                <a:ext uri="{FF2B5EF4-FFF2-40B4-BE49-F238E27FC236}">
+                  <a16:creationId xmlns:a16="http://schemas.microsoft.com/office/drawing/2014/main" id="{8AFF5EC1-8635-4BEE-9587-C605202ACAE1}"/>
+                </a:ext>
+              </a:extLst>
+            </p:cNvPr>
+            <p:cNvSpPr txBox="1"/>
+            <p:nvPr/>
+          </p:nvSpPr>
+          <p:spPr>
+            <a:xfrm>
+              <a:off x="4852294" y="2640504"/>
+              <a:ext cx="386644" cy="369332"/>
+            </a:xfrm>
+            <a:prstGeom prst="rect">
+              <a:avLst/>
+            </a:prstGeom>
+            <a:noFill/>
+          </p:spPr>
+          <p:txBody>
+            <a:bodyPr wrap="none" rtlCol="0">
+              <a:spAutoFit/>
+            </a:bodyPr>
+            <a:lstStyle/>
+            <a:p>
+              <a:r>
+                <a:rPr lang="en-AU" dirty="0"/>
+                <a:t>-V</a:t>
+              </a:r>
+              <a:endParaRPr lang="en-AU" baseline="-25000" dirty="0"/>
+            </a:p>
+          </p:txBody>
+        </p:sp>
+      </p:grpSp>
     </p:spTree>
     <p:extLst>
       <p:ext uri="{BB962C8B-B14F-4D97-AF65-F5344CB8AC3E}">

</xml_diff>